<commit_message>
added entity/architecture overview figures to README
</commit_message>
<xml_diff>
--- a/docs/figures.pptx
+++ b/docs/figures.pptx
@@ -262,7 +262,7 @@
           <a:p>
             <a:fld id="{F1BFEF50-4C11-3F42-B49F-ED133A2E563D}" type="datetimeFigureOut">
               <a:rPr lang="en-FR" smtClean="0"/>
-              <a:t>09/04/2021</a:t>
+              <a:t>13/04/2021</a:t>
             </a:fld>
             <a:endParaRPr lang="en-FR"/>
           </a:p>
@@ -462,7 +462,7 @@
           <a:p>
             <a:fld id="{F1BFEF50-4C11-3F42-B49F-ED133A2E563D}" type="datetimeFigureOut">
               <a:rPr lang="en-FR" smtClean="0"/>
-              <a:t>09/04/2021</a:t>
+              <a:t>13/04/2021</a:t>
             </a:fld>
             <a:endParaRPr lang="en-FR"/>
           </a:p>
@@ -672,7 +672,7 @@
           <a:p>
             <a:fld id="{F1BFEF50-4C11-3F42-B49F-ED133A2E563D}" type="datetimeFigureOut">
               <a:rPr lang="en-FR" smtClean="0"/>
-              <a:t>09/04/2021</a:t>
+              <a:t>13/04/2021</a:t>
             </a:fld>
             <a:endParaRPr lang="en-FR"/>
           </a:p>
@@ -872,7 +872,7 @@
           <a:p>
             <a:fld id="{F1BFEF50-4C11-3F42-B49F-ED133A2E563D}" type="datetimeFigureOut">
               <a:rPr lang="en-FR" smtClean="0"/>
-              <a:t>09/04/2021</a:t>
+              <a:t>13/04/2021</a:t>
             </a:fld>
             <a:endParaRPr lang="en-FR"/>
           </a:p>
@@ -1148,7 +1148,7 @@
           <a:p>
             <a:fld id="{F1BFEF50-4C11-3F42-B49F-ED133A2E563D}" type="datetimeFigureOut">
               <a:rPr lang="en-FR" smtClean="0"/>
-              <a:t>09/04/2021</a:t>
+              <a:t>13/04/2021</a:t>
             </a:fld>
             <a:endParaRPr lang="en-FR"/>
           </a:p>
@@ -1416,7 +1416,7 @@
           <a:p>
             <a:fld id="{F1BFEF50-4C11-3F42-B49F-ED133A2E563D}" type="datetimeFigureOut">
               <a:rPr lang="en-FR" smtClean="0"/>
-              <a:t>09/04/2021</a:t>
+              <a:t>13/04/2021</a:t>
             </a:fld>
             <a:endParaRPr lang="en-FR"/>
           </a:p>
@@ -1831,7 +1831,7 @@
           <a:p>
             <a:fld id="{F1BFEF50-4C11-3F42-B49F-ED133A2E563D}" type="datetimeFigureOut">
               <a:rPr lang="en-FR" smtClean="0"/>
-              <a:t>09/04/2021</a:t>
+              <a:t>13/04/2021</a:t>
             </a:fld>
             <a:endParaRPr lang="en-FR"/>
           </a:p>
@@ -1973,7 +1973,7 @@
           <a:p>
             <a:fld id="{F1BFEF50-4C11-3F42-B49F-ED133A2E563D}" type="datetimeFigureOut">
               <a:rPr lang="en-FR" smtClean="0"/>
-              <a:t>09/04/2021</a:t>
+              <a:t>13/04/2021</a:t>
             </a:fld>
             <a:endParaRPr lang="en-FR"/>
           </a:p>
@@ -2086,7 +2086,7 @@
           <a:p>
             <a:fld id="{F1BFEF50-4C11-3F42-B49F-ED133A2E563D}" type="datetimeFigureOut">
               <a:rPr lang="en-FR" smtClean="0"/>
-              <a:t>09/04/2021</a:t>
+              <a:t>13/04/2021</a:t>
             </a:fld>
             <a:endParaRPr lang="en-FR"/>
           </a:p>
@@ -2399,7 +2399,7 @@
           <a:p>
             <a:fld id="{F1BFEF50-4C11-3F42-B49F-ED133A2E563D}" type="datetimeFigureOut">
               <a:rPr lang="en-FR" smtClean="0"/>
-              <a:t>09/04/2021</a:t>
+              <a:t>13/04/2021</a:t>
             </a:fld>
             <a:endParaRPr lang="en-FR"/>
           </a:p>
@@ -2688,7 +2688,7 @@
           <a:p>
             <a:fld id="{F1BFEF50-4C11-3F42-B49F-ED133A2E563D}" type="datetimeFigureOut">
               <a:rPr lang="en-FR" smtClean="0"/>
-              <a:t>09/04/2021</a:t>
+              <a:t>13/04/2021</a:t>
             </a:fld>
             <a:endParaRPr lang="en-FR"/>
           </a:p>
@@ -2931,7 +2931,7 @@
           <a:p>
             <a:fld id="{F1BFEF50-4C11-3F42-B49F-ED133A2E563D}" type="datetimeFigureOut">
               <a:rPr lang="en-FR" smtClean="0"/>
-              <a:t>09/04/2021</a:t>
+              <a:t>13/04/2021</a:t>
             </a:fld>
             <a:endParaRPr lang="en-FR"/>
           </a:p>
@@ -3951,8 +3951,8 @@
         </p:nvSpPr>
         <p:spPr>
           <a:xfrm>
-            <a:off x="3998803" y="4985968"/>
-            <a:ext cx="4470233" cy="646331"/>
+            <a:off x="3998802" y="4985968"/>
+            <a:ext cx="5562639" cy="646331"/>
           </a:xfrm>
           <a:prstGeom prst="rect">
             <a:avLst/>
@@ -3979,7 +3979,7 @@
                 <a:latin typeface="Anonymice Powerline" panose="02060609030202000504" pitchFamily="49" charset="0"/>
                 <a:ea typeface="Anonymice Powerline" panose="02060609030202000504" pitchFamily="49" charset="0"/>
               </a:rPr>
-              <a:t>API Returns UUID with empty tweet</a:t>
+              <a:t>API Returns unprocessed tweet with UUID</a:t>
             </a:r>
           </a:p>
         </p:txBody>
@@ -4246,8 +4246,8 @@
         </p:nvSpPr>
         <p:spPr>
           <a:xfrm>
-            <a:off x="1427843" y="676242"/>
-            <a:ext cx="9136267" cy="2130228"/>
+            <a:off x="1427843" y="676241"/>
+            <a:ext cx="9136267" cy="2553975"/>
           </a:xfrm>
           <a:prstGeom prst="roundRect">
             <a:avLst/>
@@ -4340,17 +4340,47 @@
                 <a:latin typeface="Anonymice Powerline" panose="02060609030202000504" pitchFamily="49" charset="0"/>
                 <a:ea typeface="Anonymice Powerline" panose="02060609030202000504" pitchFamily="49" charset="0"/>
               </a:rPr>
-              <a:t>ategory {string enum}</a:t>
-            </a:r>
-            <a:r>
-              <a:rPr lang="en-FR" sz="1400" dirty="0">
+              <a:t>ategory {string ‘</a:t>
+            </a:r>
+            <a:r>
+              <a:rPr lang="en-GB" sz="1400" dirty="0">
                 <a:solidFill>
                   <a:schemeClr val="tx1"/>
                 </a:solidFill>
                 <a:latin typeface="Anonymice Powerline" panose="02060609030202000504" pitchFamily="49" charset="0"/>
                 <a:ea typeface="Anonymice Powerline" panose="02060609030202000504" pitchFamily="49" charset="0"/>
               </a:rPr>
-              <a:t>: Added at update by ml service</a:t>
+              <a:t>ham’, ’spam’, ‘unprocessed</a:t>
+            </a:r>
+            <a:r>
+              <a:rPr lang="en-FR" sz="1400" dirty="0">
+                <a:solidFill>
+                  <a:schemeClr val="tx1"/>
+                </a:solidFill>
+                <a:latin typeface="Anonymice Powerline" panose="02060609030202000504" pitchFamily="49" charset="0"/>
+                <a:ea typeface="Anonymice Powerline" panose="02060609030202000504" pitchFamily="49" charset="0"/>
+              </a:rPr>
+              <a:t>’</a:t>
+            </a:r>
+            <a:r>
+              <a:rPr lang="en-FR" sz="1400" b="1" dirty="0">
+                <a:solidFill>
+                  <a:schemeClr val="tx1"/>
+                </a:solidFill>
+                <a:latin typeface="Anonymice Powerline" panose="02060609030202000504" pitchFamily="49" charset="0"/>
+                <a:ea typeface="Anonymice Powerline" panose="02060609030202000504" pitchFamily="49" charset="0"/>
+              </a:rPr>
+              <a:t>}</a:t>
+            </a:r>
+            <a:r>
+              <a:rPr lang="en-FR" sz="1400" dirty="0">
+                <a:solidFill>
+                  <a:schemeClr val="tx1"/>
+                </a:solidFill>
+                <a:latin typeface="Anonymice Powerline" panose="02060609030202000504" pitchFamily="49" charset="0"/>
+                <a:ea typeface="Anonymice Powerline" panose="02060609030202000504" pitchFamily="49" charset="0"/>
+              </a:rPr>
+              <a:t>: Updated by ml service</a:t>
             </a:r>
           </a:p>
           <a:p>
@@ -4366,7 +4396,7 @@
                 <a:latin typeface="Anonymice Powerline" panose="02060609030202000504" pitchFamily="49" charset="0"/>
                 <a:ea typeface="Anonymice Powerline" panose="02060609030202000504" pitchFamily="49" charset="0"/>
               </a:rPr>
-              <a:t>t</a:t>
+              <a:t>p</a:t>
             </a:r>
             <a:r>
               <a:rPr lang="en-FR" sz="1400" b="1" dirty="0">
@@ -4376,7 +4406,7 @@
                 <a:latin typeface="Anonymice Powerline" panose="02060609030202000504" pitchFamily="49" charset="0"/>
                 <a:ea typeface="Anonymice Powerline" panose="02060609030202000504" pitchFamily="49" charset="0"/>
               </a:rPr>
-              <a:t>ext {string max 280 chars}</a:t>
+              <a:t>rofanity_index {float}:</a:t>
             </a:r>
             <a:r>
               <a:rPr lang="en-FR" sz="1400" dirty="0">
@@ -4386,7 +4416,7 @@
                 <a:latin typeface="Anonymice Powerline" panose="02060609030202000504" pitchFamily="49" charset="0"/>
                 <a:ea typeface="Anonymice Powerline" panose="02060609030202000504" pitchFamily="49" charset="0"/>
               </a:rPr>
-              <a:t>: Added at update by ml service</a:t>
+              <a:t> Initially 0 then updated by ml service</a:t>
             </a:r>
           </a:p>
           <a:p>
@@ -4402,6 +4432,49 @@
                 <a:latin typeface="Anonymice Powerline" panose="02060609030202000504" pitchFamily="49" charset="0"/>
                 <a:ea typeface="Anonymice Powerline" panose="02060609030202000504" pitchFamily="49" charset="0"/>
               </a:rPr>
+              <a:t>t</a:t>
+            </a:r>
+            <a:r>
+              <a:rPr lang="en-FR" sz="1400" b="1" dirty="0">
+                <a:solidFill>
+                  <a:schemeClr val="tx1"/>
+                </a:solidFill>
+                <a:latin typeface="Anonymice Powerline" panose="02060609030202000504" pitchFamily="49" charset="0"/>
+                <a:ea typeface="Anonymice Powerline" panose="02060609030202000504" pitchFamily="49" charset="0"/>
+              </a:rPr>
+              <a:t>ext {string max 280 chars}: </a:t>
+            </a:r>
+            <a:r>
+              <a:rPr lang="en-FR" sz="1400" dirty="0">
+                <a:solidFill>
+                  <a:schemeClr val="tx1"/>
+                </a:solidFill>
+                <a:latin typeface="Anonymice Powerline" panose="02060609030202000504" pitchFamily="49" charset="0"/>
+                <a:ea typeface="Anonymice Powerline" panose="02060609030202000504" pitchFamily="49" charset="0"/>
+              </a:rPr>
+              <a:t>Content of the tweet</a:t>
+            </a:r>
+            <a:endParaRPr lang="en-FR" sz="1400" b="1" dirty="0">
+              <a:solidFill>
+                <a:schemeClr val="tx1"/>
+              </a:solidFill>
+              <a:latin typeface="Anonymice Powerline" panose="02060609030202000504" pitchFamily="49" charset="0"/>
+              <a:ea typeface="Anonymice Powerline" panose="02060609030202000504" pitchFamily="49" charset="0"/>
+            </a:endParaRPr>
+          </a:p>
+          <a:p>
+            <a:pPr marL="285750" indent="-285750">
+              <a:buFont typeface="Arial" panose="020B0604020202020204" pitchFamily="34" charset="0"/>
+              <a:buChar char="•"/>
+            </a:pPr>
+            <a:r>
+              <a:rPr lang="en-GB" sz="1400" b="1" dirty="0">
+                <a:solidFill>
+                  <a:schemeClr val="tx1"/>
+                </a:solidFill>
+                <a:latin typeface="Anonymice Powerline" panose="02060609030202000504" pitchFamily="49" charset="0"/>
+                <a:ea typeface="Anonymice Powerline" panose="02060609030202000504" pitchFamily="49" charset="0"/>
+              </a:rPr>
               <a:t>p</a:t>
             </a:r>
             <a:r>
@@ -4422,14 +4495,8 @@
                 <a:latin typeface="Anonymice Powerline" panose="02060609030202000504" pitchFamily="49" charset="0"/>
                 <a:ea typeface="Anonymice Powerline" panose="02060609030202000504" pitchFamily="49" charset="0"/>
               </a:rPr>
-              <a:t>: Added at update by ml service</a:t>
-            </a:r>
-          </a:p>
-          <a:p>
-            <a:pPr marL="285750" indent="-285750">
-              <a:buFont typeface="Arial" panose="020B0604020202020204" pitchFamily="34" charset="0"/>
-              <a:buChar char="•"/>
-            </a:pPr>
+              <a:t>: Added at update by ml service </a:t>
+            </a:r>
             <a:r>
               <a:rPr lang="en-GB" sz="1400" b="1" dirty="0">
                 <a:solidFill>
@@ -4682,6 +4749,22 @@
                 <a:ea typeface="Anonymice Powerline" panose="02060609030202000504" pitchFamily="49" charset="0"/>
               </a:rPr>
               <a:t>ext {string max 280 chars}</a:t>
+            </a:r>
+          </a:p>
+          <a:p>
+            <a:pPr marL="285750" indent="-285750">
+              <a:buFont typeface="Arial" panose="020B0604020202020204" pitchFamily="34" charset="0"/>
+              <a:buChar char="•"/>
+            </a:pPr>
+            <a:r>
+              <a:rPr lang="en-FR" sz="1400" b="1" dirty="0">
+                <a:solidFill>
+                  <a:schemeClr val="tx1"/>
+                </a:solidFill>
+                <a:latin typeface="Anonymice Powerline" panose="02060609030202000504" pitchFamily="49" charset="0"/>
+                <a:ea typeface="Anonymice Powerline" panose="02060609030202000504" pitchFamily="49" charset="0"/>
+              </a:rPr>
+              <a:t>avar_url {string}</a:t>
             </a:r>
             <a:endParaRPr lang="en-FR" sz="1400" dirty="0">
               <a:solidFill>

</xml_diff>